<commit_message>
23Feb2022 maven plugins included in pom.xml
</commit_message>
<xml_diff>
--- a/target/test-classes/TestNG.pptx
+++ b/target/test-classes/TestNG.pptx
@@ -270,7 +270,7 @@
           <a:p>
             <a:fld id="{474FEC44-FE25-432A-B7F6-7BDB637AC3B5}" type="datetimeFigureOut">
               <a:rPr lang="en-IN" smtClean="0"/>
-              <a:t>04-09-2021</a:t>
+              <a:t>11-02-2022</a:t>
             </a:fld>
             <a:endParaRPr lang="en-IN"/>
           </a:p>
@@ -470,7 +470,7 @@
           <a:p>
             <a:fld id="{474FEC44-FE25-432A-B7F6-7BDB637AC3B5}" type="datetimeFigureOut">
               <a:rPr lang="en-IN" smtClean="0"/>
-              <a:t>04-09-2021</a:t>
+              <a:t>11-02-2022</a:t>
             </a:fld>
             <a:endParaRPr lang="en-IN"/>
           </a:p>
@@ -680,7 +680,7 @@
           <a:p>
             <a:fld id="{474FEC44-FE25-432A-B7F6-7BDB637AC3B5}" type="datetimeFigureOut">
               <a:rPr lang="en-IN" smtClean="0"/>
-              <a:t>04-09-2021</a:t>
+              <a:t>11-02-2022</a:t>
             </a:fld>
             <a:endParaRPr lang="en-IN"/>
           </a:p>
@@ -880,7 +880,7 @@
           <a:p>
             <a:fld id="{474FEC44-FE25-432A-B7F6-7BDB637AC3B5}" type="datetimeFigureOut">
               <a:rPr lang="en-IN" smtClean="0"/>
-              <a:t>04-09-2021</a:t>
+              <a:t>11-02-2022</a:t>
             </a:fld>
             <a:endParaRPr lang="en-IN"/>
           </a:p>
@@ -1156,7 +1156,7 @@
           <a:p>
             <a:fld id="{474FEC44-FE25-432A-B7F6-7BDB637AC3B5}" type="datetimeFigureOut">
               <a:rPr lang="en-IN" smtClean="0"/>
-              <a:t>04-09-2021</a:t>
+              <a:t>11-02-2022</a:t>
             </a:fld>
             <a:endParaRPr lang="en-IN"/>
           </a:p>
@@ -1424,7 +1424,7 @@
           <a:p>
             <a:fld id="{474FEC44-FE25-432A-B7F6-7BDB637AC3B5}" type="datetimeFigureOut">
               <a:rPr lang="en-IN" smtClean="0"/>
-              <a:t>04-09-2021</a:t>
+              <a:t>11-02-2022</a:t>
             </a:fld>
             <a:endParaRPr lang="en-IN"/>
           </a:p>
@@ -1839,7 +1839,7 @@
           <a:p>
             <a:fld id="{474FEC44-FE25-432A-B7F6-7BDB637AC3B5}" type="datetimeFigureOut">
               <a:rPr lang="en-IN" smtClean="0"/>
-              <a:t>04-09-2021</a:t>
+              <a:t>11-02-2022</a:t>
             </a:fld>
             <a:endParaRPr lang="en-IN"/>
           </a:p>
@@ -1981,7 +1981,7 @@
           <a:p>
             <a:fld id="{474FEC44-FE25-432A-B7F6-7BDB637AC3B5}" type="datetimeFigureOut">
               <a:rPr lang="en-IN" smtClean="0"/>
-              <a:t>04-09-2021</a:t>
+              <a:t>11-02-2022</a:t>
             </a:fld>
             <a:endParaRPr lang="en-IN"/>
           </a:p>
@@ -2094,7 +2094,7 @@
           <a:p>
             <a:fld id="{474FEC44-FE25-432A-B7F6-7BDB637AC3B5}" type="datetimeFigureOut">
               <a:rPr lang="en-IN" smtClean="0"/>
-              <a:t>04-09-2021</a:t>
+              <a:t>11-02-2022</a:t>
             </a:fld>
             <a:endParaRPr lang="en-IN"/>
           </a:p>
@@ -2407,7 +2407,7 @@
           <a:p>
             <a:fld id="{474FEC44-FE25-432A-B7F6-7BDB637AC3B5}" type="datetimeFigureOut">
               <a:rPr lang="en-IN" smtClean="0"/>
-              <a:t>04-09-2021</a:t>
+              <a:t>11-02-2022</a:t>
             </a:fld>
             <a:endParaRPr lang="en-IN"/>
           </a:p>
@@ -2696,7 +2696,7 @@
           <a:p>
             <a:fld id="{474FEC44-FE25-432A-B7F6-7BDB637AC3B5}" type="datetimeFigureOut">
               <a:rPr lang="en-IN" smtClean="0"/>
-              <a:t>04-09-2021</a:t>
+              <a:t>11-02-2022</a:t>
             </a:fld>
             <a:endParaRPr lang="en-IN"/>
           </a:p>
@@ -2939,7 +2939,7 @@
           <a:p>
             <a:fld id="{474FEC44-FE25-432A-B7F6-7BDB637AC3B5}" type="datetimeFigureOut">
               <a:rPr lang="en-IN" smtClean="0"/>
-              <a:t>04-09-2021</a:t>
+              <a:t>11-02-2022</a:t>
             </a:fld>
             <a:endParaRPr lang="en-IN"/>
           </a:p>
@@ -6541,25 +6541,7 @@
                 </a:solidFill>
                 <a:latin typeface="Arial" panose="020B0604020202020204" pitchFamily="34" charset="0"/>
               </a:rPr>
-              <a:t> is meant to </a:t>
-            </a:r>
-            <a:r>
-              <a:rPr lang="en-US" sz="2000">
-                <a:solidFill>
-                  <a:srgbClr val="4D4D4D"/>
-                </a:solidFill>
-                <a:latin typeface="Arial" panose="020B0604020202020204" pitchFamily="34" charset="0"/>
-              </a:rPr>
-              <a:t>send parameters </a:t>
-            </a:r>
-            <a:r>
-              <a:rPr lang="en-US" sz="2000" dirty="0">
-                <a:solidFill>
-                  <a:srgbClr val="4D4D4D"/>
-                </a:solidFill>
-                <a:latin typeface="Arial" panose="020B0604020202020204" pitchFamily="34" charset="0"/>
-              </a:rPr>
-              <a:t>to the methods, Where the </a:t>
+              <a:t> is meant to send parameters to the methods, Where the </a:t>
             </a:r>
             <a:r>
               <a:rPr lang="en-US" sz="2000" b="1" dirty="0">

</xml_diff>